<commit_message>
Fix animation in ppt
</commit_message>
<xml_diff>
--- a/devcruise-docker-k8s-helm.pptx
+++ b/devcruise-docker-k8s-helm.pptx
@@ -229,7 +229,7 @@
           <a:p>
             <a:fld id="{16894A9E-B98D-4389-8596-7173464DD1DA}" type="datetimeFigureOut">
               <a:rPr lang="en-BE" smtClean="0"/>
-              <a:t>19/09/2021</a:t>
+              <a:t>24/09/2021</a:t>
             </a:fld>
             <a:endParaRPr lang="en-BE"/>
           </a:p>
@@ -11572,7 +11572,7 @@
           <a:p>
             <a:fld id="{C827F8F9-40BA-4649-A417-DE4BA6E4AC69}" type="datetime8">
               <a:rPr lang="en-BE" smtClean="0"/>
-              <a:t>19/09/2021 21:58</a:t>
+              <a:t>24/09/2021 09:17</a:t>
             </a:fld>
             <a:endParaRPr lang="en-BE"/>
           </a:p>
@@ -11868,7 +11868,7 @@
           <a:p>
             <a:fld id="{DF1546DB-CB61-49AE-B774-4B3528A1E980}" type="datetime8">
               <a:rPr lang="en-BE" smtClean="0"/>
-              <a:t>19/09/2021 21:58</a:t>
+              <a:t>24/09/2021 09:17</a:t>
             </a:fld>
             <a:endParaRPr lang="en-BE"/>
           </a:p>
@@ -12116,7 +12116,7 @@
           <a:p>
             <a:fld id="{43E2146D-FAF8-45E8-A1BA-F5BF068D4D13}" type="datetime8">
               <a:rPr lang="en-BE" smtClean="0"/>
-              <a:t>19/09/2021 21:58</a:t>
+              <a:t>24/09/2021 09:17</a:t>
             </a:fld>
             <a:endParaRPr lang="en-BE"/>
           </a:p>
@@ -12656,7 +12656,7 @@
           <a:p>
             <a:fld id="{4845A627-6093-4931-B34C-FAD511638697}" type="datetime8">
               <a:rPr lang="en-BE" smtClean="0"/>
-              <a:t>19/09/2021 21:58</a:t>
+              <a:t>24/09/2021 09:17</a:t>
             </a:fld>
             <a:endParaRPr lang="en-BE"/>
           </a:p>
@@ -12904,7 +12904,7 @@
           <a:p>
             <a:fld id="{E4312F6B-E5C7-40CB-9DA0-EDFD75720D82}" type="datetime8">
               <a:rPr lang="en-BE" smtClean="0"/>
-              <a:t>19/09/2021 21:58</a:t>
+              <a:t>24/09/2021 09:17</a:t>
             </a:fld>
             <a:endParaRPr lang="en-BE"/>
           </a:p>
@@ -13436,7 +13436,7 @@
           <a:p>
             <a:fld id="{EB89356C-D740-4182-B79D-73514DC277FE}" type="datetime8">
               <a:rPr lang="en-BE" smtClean="0"/>
-              <a:t>19/09/2021 21:58</a:t>
+              <a:t>24/09/2021 09:17</a:t>
             </a:fld>
             <a:endParaRPr lang="en-BE"/>
           </a:p>
@@ -13733,7 +13733,7 @@
           <a:p>
             <a:fld id="{7BB99495-7AF4-4DE0-BCC5-2CE906F5CDA2}" type="datetime8">
               <a:rPr lang="en-BE" smtClean="0"/>
-              <a:t>19/09/2021 21:58</a:t>
+              <a:t>24/09/2021 09:17</a:t>
             </a:fld>
             <a:endParaRPr lang="en-BE"/>
           </a:p>
@@ -13907,7 +13907,7 @@
           <a:p>
             <a:fld id="{D0205720-BFCB-4147-8A3F-ECD583D5EBE4}" type="datetime8">
               <a:rPr lang="en-BE" smtClean="0"/>
-              <a:t>19/09/2021 21:58</a:t>
+              <a:t>24/09/2021 09:17</a:t>
             </a:fld>
             <a:endParaRPr lang="en-BE"/>
           </a:p>
@@ -14087,7 +14087,7 @@
           <a:p>
             <a:fld id="{AE51FA4E-282E-4C72-8119-6F6F97DB07B7}" type="datetime8">
               <a:rPr lang="en-BE" smtClean="0"/>
-              <a:t>19/09/2021 21:58</a:t>
+              <a:t>24/09/2021 09:17</a:t>
             </a:fld>
             <a:endParaRPr lang="en-BE"/>
           </a:p>
@@ -14257,7 +14257,7 @@
           <a:p>
             <a:fld id="{B975662B-1F44-4FC5-A784-5D1C2D6763D9}" type="datetime8">
               <a:rPr lang="en-BE" smtClean="0"/>
-              <a:t>19/09/2021 21:58</a:t>
+              <a:t>24/09/2021 09:17</a:t>
             </a:fld>
             <a:endParaRPr lang="en-BE"/>
           </a:p>
@@ -14508,7 +14508,7 @@
           <a:p>
             <a:fld id="{B26ABDE1-292E-4AB1-853A-E91724AEF735}" type="datetime8">
               <a:rPr lang="en-BE" smtClean="0"/>
-              <a:t>19/09/2021 21:58</a:t>
+              <a:t>24/09/2021 09:17</a:t>
             </a:fld>
             <a:endParaRPr lang="en-BE"/>
           </a:p>
@@ -14805,7 +14805,7 @@
           <a:p>
             <a:fld id="{C34008D9-766B-41E9-8090-7D5328CCA98D}" type="datetime8">
               <a:rPr lang="en-BE" smtClean="0"/>
-              <a:t>19/09/2021 21:58</a:t>
+              <a:t>24/09/2021 09:17</a:t>
             </a:fld>
             <a:endParaRPr lang="en-BE"/>
           </a:p>
@@ -15247,7 +15247,7 @@
           <a:p>
             <a:fld id="{8D29F466-90AB-40C5-92D6-8D7F23B83D58}" type="datetime8">
               <a:rPr lang="en-BE" smtClean="0"/>
-              <a:t>19/09/2021 21:58</a:t>
+              <a:t>24/09/2021 09:17</a:t>
             </a:fld>
             <a:endParaRPr lang="en-BE"/>
           </a:p>
@@ -15365,7 +15365,7 @@
           <a:p>
             <a:fld id="{6BBBBED1-6919-4C19-A312-783C3AD1C3FD}" type="datetime8">
               <a:rPr lang="en-BE" smtClean="0"/>
-              <a:t>19/09/2021 21:58</a:t>
+              <a:t>24/09/2021 09:17</a:t>
             </a:fld>
             <a:endParaRPr lang="en-BE"/>
           </a:p>
@@ -15460,7 +15460,7 @@
           <a:p>
             <a:fld id="{BE46CA21-E075-4393-AE55-14CAD6BF7599}" type="datetime8">
               <a:rPr lang="en-BE" smtClean="0"/>
-              <a:t>19/09/2021 21:58</a:t>
+              <a:t>24/09/2021 09:17</a:t>
             </a:fld>
             <a:endParaRPr lang="en-BE"/>
           </a:p>
@@ -15743,7 +15743,7 @@
           <a:p>
             <a:fld id="{7D86ED90-3CAB-4A08-9C1E-2D5F65C3B601}" type="datetime8">
               <a:rPr lang="en-BE" smtClean="0"/>
-              <a:t>19/09/2021 21:58</a:t>
+              <a:t>24/09/2021 09:17</a:t>
             </a:fld>
             <a:endParaRPr lang="en-BE"/>
           </a:p>
@@ -16034,7 +16034,7 @@
           <a:p>
             <a:fld id="{ED4D6C0E-5451-4560-9E56-D77B9755D01C}" type="datetime8">
               <a:rPr lang="en-BE" smtClean="0"/>
-              <a:t>19/09/2021 21:58</a:t>
+              <a:t>24/09/2021 09:17</a:t>
             </a:fld>
             <a:endParaRPr lang="en-BE"/>
           </a:p>
@@ -16564,7 +16564,7 @@
           <a:p>
             <a:fld id="{EF0538A9-B1B9-4B06-9E91-1EA355D0A2FD}" type="datetime8">
               <a:rPr lang="en-BE" smtClean="0"/>
-              <a:t>19/09/2021 21:58</a:t>
+              <a:t>24/09/2021 09:17</a:t>
             </a:fld>
             <a:endParaRPr lang="en-BE"/>
           </a:p>
@@ -18153,7 +18153,7 @@
                                         <p:tgtEl>
                                           <p:spTgt spid="5">
                                             <p:txEl>
-                                              <p:pRg st="3" end="3"/>
+                                              <p:pRg st="0" end="0"/>
                                             </p:txEl>
                                           </p:spTgt>
                                         </p:tgtEl>
@@ -18171,7 +18171,7 @@
                                         <p:tgtEl>
                                           <p:spTgt spid="5">
                                             <p:txEl>
-                                              <p:pRg st="3" end="3"/>
+                                              <p:pRg st="0" end="0"/>
                                             </p:txEl>
                                           </p:spTgt>
                                         </p:tgtEl>
@@ -18214,7 +18214,7 @@
                                         <p:tgtEl>
                                           <p:spTgt spid="5">
                                             <p:txEl>
-                                              <p:pRg st="0" end="0"/>
+                                              <p:pRg st="1" end="1"/>
                                             </p:txEl>
                                           </p:spTgt>
                                         </p:tgtEl>
@@ -18232,7 +18232,7 @@
                                         <p:tgtEl>
                                           <p:spTgt spid="5">
                                             <p:txEl>
-                                              <p:pRg st="0" end="0"/>
+                                              <p:pRg st="1" end="1"/>
                                             </p:txEl>
                                           </p:spTgt>
                                         </p:tgtEl>
@@ -18275,7 +18275,7 @@
                                         <p:tgtEl>
                                           <p:spTgt spid="5">
                                             <p:txEl>
-                                              <p:pRg st="1" end="1"/>
+                                              <p:pRg st="3" end="3"/>
                                             </p:txEl>
                                           </p:spTgt>
                                         </p:tgtEl>
@@ -18293,7 +18293,7 @@
                                         <p:tgtEl>
                                           <p:spTgt spid="5">
                                             <p:txEl>
-                                              <p:pRg st="1" end="1"/>
+                                              <p:pRg st="3" end="3"/>
                                             </p:txEl>
                                           </p:spTgt>
                                         </p:tgtEl>

</xml_diff>